<commit_message>
Update ABP Studio - The Missing Tool for Dotnet Developers.pptx
</commit_message>
<xml_diff>
--- a/2024-08-15 ABP Community Talks 2024.4/ABP Studio - The Missing Tool for Dotnet Developers.pptx
+++ b/2024-08-15 ABP Community Talks 2024.4/ABP Studio - The Missing Tool for Dotnet Developers.pptx
@@ -8,20 +8,22 @@
     <p:sldId id="256" r:id="rId2"/>
     <p:sldId id="257" r:id="rId3"/>
     <p:sldId id="258" r:id="rId4"/>
-    <p:sldId id="259" r:id="rId5"/>
-    <p:sldId id="260" r:id="rId6"/>
-    <p:sldId id="261" r:id="rId7"/>
-    <p:sldId id="262" r:id="rId8"/>
-    <p:sldId id="263" r:id="rId9"/>
-    <p:sldId id="264" r:id="rId10"/>
-    <p:sldId id="265" r:id="rId11"/>
-    <p:sldId id="266" r:id="rId12"/>
-    <p:sldId id="267" r:id="rId13"/>
-    <p:sldId id="268" r:id="rId14"/>
-    <p:sldId id="269" r:id="rId15"/>
-    <p:sldId id="270" r:id="rId16"/>
-    <p:sldId id="271" r:id="rId17"/>
-    <p:sldId id="272" r:id="rId18"/>
+    <p:sldId id="273" r:id="rId5"/>
+    <p:sldId id="259" r:id="rId6"/>
+    <p:sldId id="274" r:id="rId7"/>
+    <p:sldId id="260" r:id="rId8"/>
+    <p:sldId id="261" r:id="rId9"/>
+    <p:sldId id="262" r:id="rId10"/>
+    <p:sldId id="263" r:id="rId11"/>
+    <p:sldId id="264" r:id="rId12"/>
+    <p:sldId id="265" r:id="rId13"/>
+    <p:sldId id="266" r:id="rId14"/>
+    <p:sldId id="267" r:id="rId15"/>
+    <p:sldId id="268" r:id="rId16"/>
+    <p:sldId id="269" r:id="rId17"/>
+    <p:sldId id="270" r:id="rId18"/>
+    <p:sldId id="271" r:id="rId19"/>
+    <p:sldId id="272" r:id="rId20"/>
   </p:sldIdLst>
   <p:sldSz cx="12192000" cy="6858000"/>
   <p:notesSz cx="6858000" cy="9144000"/>
@@ -3548,7 +3550,7 @@
     </p:spTree>
     <p:extLst>
       <p:ext uri="{BB962C8B-B14F-4D97-AF65-F5344CB8AC3E}">
-        <p14:creationId xmlns:p14="http://schemas.microsoft.com/office/powerpoint/2010/main" val="2237470617"/>
+        <p14:creationId xmlns:p14="http://schemas.microsoft.com/office/powerpoint/2010/main" val="3274601683"/>
       </p:ext>
     </p:extLst>
   </p:cSld>
@@ -3657,7 +3659,7 @@
     </p:spTree>
     <p:extLst>
       <p:ext uri="{BB962C8B-B14F-4D97-AF65-F5344CB8AC3E}">
-        <p14:creationId xmlns:p14="http://schemas.microsoft.com/office/powerpoint/2010/main" val="293445063"/>
+        <p14:creationId xmlns:p14="http://schemas.microsoft.com/office/powerpoint/2010/main" val="1519802074"/>
       </p:ext>
     </p:extLst>
   </p:cSld>
@@ -3766,7 +3768,7 @@
     </p:spTree>
     <p:extLst>
       <p:ext uri="{BB962C8B-B14F-4D97-AF65-F5344CB8AC3E}">
-        <p14:creationId xmlns:p14="http://schemas.microsoft.com/office/powerpoint/2010/main" val="228140593"/>
+        <p14:creationId xmlns:p14="http://schemas.microsoft.com/office/powerpoint/2010/main" val="2237470617"/>
       </p:ext>
     </p:extLst>
   </p:cSld>
@@ -3875,7 +3877,7 @@
     </p:spTree>
     <p:extLst>
       <p:ext uri="{BB962C8B-B14F-4D97-AF65-F5344CB8AC3E}">
-        <p14:creationId xmlns:p14="http://schemas.microsoft.com/office/powerpoint/2010/main" val="2428480657"/>
+        <p14:creationId xmlns:p14="http://schemas.microsoft.com/office/powerpoint/2010/main" val="293445063"/>
       </p:ext>
     </p:extLst>
   </p:cSld>
@@ -3984,7 +3986,7 @@
     </p:spTree>
     <p:extLst>
       <p:ext uri="{BB962C8B-B14F-4D97-AF65-F5344CB8AC3E}">
-        <p14:creationId xmlns:p14="http://schemas.microsoft.com/office/powerpoint/2010/main" val="3141616852"/>
+        <p14:creationId xmlns:p14="http://schemas.microsoft.com/office/powerpoint/2010/main" val="228140593"/>
       </p:ext>
     </p:extLst>
   </p:cSld>
@@ -4093,7 +4095,7 @@
     </p:spTree>
     <p:extLst>
       <p:ext uri="{BB962C8B-B14F-4D97-AF65-F5344CB8AC3E}">
-        <p14:creationId xmlns:p14="http://schemas.microsoft.com/office/powerpoint/2010/main" val="2206496468"/>
+        <p14:creationId xmlns:p14="http://schemas.microsoft.com/office/powerpoint/2010/main" val="2428480657"/>
       </p:ext>
     </p:extLst>
   </p:cSld>
@@ -4202,6 +4204,224 @@
     </p:spTree>
     <p:extLst>
       <p:ext uri="{BB962C8B-B14F-4D97-AF65-F5344CB8AC3E}">
+        <p14:creationId xmlns:p14="http://schemas.microsoft.com/office/powerpoint/2010/main" val="3141616852"/>
+      </p:ext>
+    </p:extLst>
+  </p:cSld>
+  <p:clrMapOvr>
+    <a:masterClrMapping/>
+  </p:clrMapOvr>
+</p:sld>
+</file>
+
+<file path=ppt/slides/slide17.xml><?xml version="1.0" encoding="utf-8"?>
+<p:sld xmlns:a="http://schemas.openxmlformats.org/drawingml/2006/main" xmlns:r="http://schemas.openxmlformats.org/officeDocument/2006/relationships" xmlns:p="http://schemas.openxmlformats.org/presentationml/2006/main">
+  <p:cSld>
+    <p:bg>
+      <p:bgPr>
+        <a:blipFill dpi="0" rotWithShape="1">
+          <a:blip r:embed="rId2">
+            <a:lum/>
+          </a:blip>
+          <a:srcRect/>
+          <a:stretch>
+            <a:fillRect/>
+          </a:stretch>
+        </a:blipFill>
+        <a:effectLst/>
+      </p:bgPr>
+    </p:bg>
+    <p:spTree>
+      <p:nvGrpSpPr>
+        <p:cNvPr id="1" name=""/>
+        <p:cNvGrpSpPr/>
+        <p:nvPr/>
+      </p:nvGrpSpPr>
+      <p:grpSpPr>
+        <a:xfrm>
+          <a:off x="0" y="0"/>
+          <a:ext cx="0" cy="0"/>
+          <a:chOff x="0" y="0"/>
+          <a:chExt cx="0" cy="0"/>
+        </a:xfrm>
+      </p:grpSpPr>
+      <p:sp>
+        <p:nvSpPr>
+          <p:cNvPr id="2" name="Title 1">
+            <a:extLst>
+              <a:ext uri="{FF2B5EF4-FFF2-40B4-BE49-F238E27FC236}">
+                <a16:creationId xmlns:a16="http://schemas.microsoft.com/office/drawing/2014/main" id="{55E11F08-6CA0-48F1-AD67-97430DDA07F0}"/>
+              </a:ext>
+            </a:extLst>
+          </p:cNvPr>
+          <p:cNvSpPr>
+            <a:spLocks noGrp="1"/>
+          </p:cNvSpPr>
+          <p:nvPr>
+            <p:ph type="title"/>
+          </p:nvPr>
+        </p:nvSpPr>
+        <p:spPr/>
+        <p:txBody>
+          <a:bodyPr/>
+          <a:lstStyle/>
+          <a:p>
+            <a:r>
+              <a:rPr lang="en-US" b="1" dirty="0">
+                <a:solidFill>
+                  <a:srgbClr val="292D33"/>
+                </a:solidFill>
+                <a:latin typeface="Euclid Circular B" panose="020B0504000000000000" pitchFamily="34" charset="0"/>
+                <a:ea typeface="Euclid Circular B" panose="020B0504000000000000" pitchFamily="34" charset="0"/>
+              </a:rPr>
+              <a:t>Topic title</a:t>
+            </a:r>
+          </a:p>
+        </p:txBody>
+      </p:sp>
+      <p:sp>
+        <p:nvSpPr>
+          <p:cNvPr id="3" name="Content Placeholder 2">
+            <a:extLst>
+              <a:ext uri="{FF2B5EF4-FFF2-40B4-BE49-F238E27FC236}">
+                <a16:creationId xmlns:a16="http://schemas.microsoft.com/office/drawing/2014/main" id="{891C7693-D3DF-4635-96F4-97F3B4136FDF}"/>
+              </a:ext>
+            </a:extLst>
+          </p:cNvPr>
+          <p:cNvSpPr>
+            <a:spLocks noGrp="1"/>
+          </p:cNvSpPr>
+          <p:nvPr>
+            <p:ph idx="1"/>
+          </p:nvPr>
+        </p:nvSpPr>
+        <p:spPr/>
+        <p:txBody>
+          <a:bodyPr/>
+          <a:lstStyle/>
+          <a:p>
+            <a:r>
+              <a:rPr lang="en-US" dirty="0">
+                <a:latin typeface="Euclid Circular B" panose="020B0504000000000000" pitchFamily="34" charset="0"/>
+                <a:ea typeface="Euclid Circular B" panose="020B0504000000000000" pitchFamily="34" charset="0"/>
+              </a:rPr>
+              <a:t>Content</a:t>
+            </a:r>
+          </a:p>
+        </p:txBody>
+      </p:sp>
+    </p:spTree>
+    <p:extLst>
+      <p:ext uri="{BB962C8B-B14F-4D97-AF65-F5344CB8AC3E}">
+        <p14:creationId xmlns:p14="http://schemas.microsoft.com/office/powerpoint/2010/main" val="2206496468"/>
+      </p:ext>
+    </p:extLst>
+  </p:cSld>
+  <p:clrMapOvr>
+    <a:masterClrMapping/>
+  </p:clrMapOvr>
+</p:sld>
+</file>
+
+<file path=ppt/slides/slide18.xml><?xml version="1.0" encoding="utf-8"?>
+<p:sld xmlns:a="http://schemas.openxmlformats.org/drawingml/2006/main" xmlns:r="http://schemas.openxmlformats.org/officeDocument/2006/relationships" xmlns:p="http://schemas.openxmlformats.org/presentationml/2006/main">
+  <p:cSld>
+    <p:bg>
+      <p:bgPr>
+        <a:blipFill dpi="0" rotWithShape="1">
+          <a:blip r:embed="rId2">
+            <a:lum/>
+          </a:blip>
+          <a:srcRect/>
+          <a:stretch>
+            <a:fillRect/>
+          </a:stretch>
+        </a:blipFill>
+        <a:effectLst/>
+      </p:bgPr>
+    </p:bg>
+    <p:spTree>
+      <p:nvGrpSpPr>
+        <p:cNvPr id="1" name=""/>
+        <p:cNvGrpSpPr/>
+        <p:nvPr/>
+      </p:nvGrpSpPr>
+      <p:grpSpPr>
+        <a:xfrm>
+          <a:off x="0" y="0"/>
+          <a:ext cx="0" cy="0"/>
+          <a:chOff x="0" y="0"/>
+          <a:chExt cx="0" cy="0"/>
+        </a:xfrm>
+      </p:grpSpPr>
+      <p:sp>
+        <p:nvSpPr>
+          <p:cNvPr id="2" name="Title 1">
+            <a:extLst>
+              <a:ext uri="{FF2B5EF4-FFF2-40B4-BE49-F238E27FC236}">
+                <a16:creationId xmlns:a16="http://schemas.microsoft.com/office/drawing/2014/main" id="{55E11F08-6CA0-48F1-AD67-97430DDA07F0}"/>
+              </a:ext>
+            </a:extLst>
+          </p:cNvPr>
+          <p:cNvSpPr>
+            <a:spLocks noGrp="1"/>
+          </p:cNvSpPr>
+          <p:nvPr>
+            <p:ph type="title"/>
+          </p:nvPr>
+        </p:nvSpPr>
+        <p:spPr/>
+        <p:txBody>
+          <a:bodyPr/>
+          <a:lstStyle/>
+          <a:p>
+            <a:r>
+              <a:rPr lang="en-US" b="1" dirty="0">
+                <a:solidFill>
+                  <a:srgbClr val="292D33"/>
+                </a:solidFill>
+                <a:latin typeface="Euclid Circular B" panose="020B0504000000000000" pitchFamily="34" charset="0"/>
+                <a:ea typeface="Euclid Circular B" panose="020B0504000000000000" pitchFamily="34" charset="0"/>
+              </a:rPr>
+              <a:t>Topic title</a:t>
+            </a:r>
+          </a:p>
+        </p:txBody>
+      </p:sp>
+      <p:sp>
+        <p:nvSpPr>
+          <p:cNvPr id="3" name="Content Placeholder 2">
+            <a:extLst>
+              <a:ext uri="{FF2B5EF4-FFF2-40B4-BE49-F238E27FC236}">
+                <a16:creationId xmlns:a16="http://schemas.microsoft.com/office/drawing/2014/main" id="{891C7693-D3DF-4635-96F4-97F3B4136FDF}"/>
+              </a:ext>
+            </a:extLst>
+          </p:cNvPr>
+          <p:cNvSpPr>
+            <a:spLocks noGrp="1"/>
+          </p:cNvSpPr>
+          <p:nvPr>
+            <p:ph idx="1"/>
+          </p:nvPr>
+        </p:nvSpPr>
+        <p:spPr/>
+        <p:txBody>
+          <a:bodyPr/>
+          <a:lstStyle/>
+          <a:p>
+            <a:r>
+              <a:rPr lang="en-US" dirty="0">
+                <a:latin typeface="Euclid Circular B" panose="020B0504000000000000" pitchFamily="34" charset="0"/>
+                <a:ea typeface="Euclid Circular B" panose="020B0504000000000000" pitchFamily="34" charset="0"/>
+              </a:rPr>
+              <a:t>Content</a:t>
+            </a:r>
+          </a:p>
+        </p:txBody>
+      </p:sp>
+    </p:spTree>
+    <p:extLst>
+      <p:ext uri="{BB962C8B-B14F-4D97-AF65-F5344CB8AC3E}">
         <p14:creationId xmlns:p14="http://schemas.microsoft.com/office/powerpoint/2010/main" val="3183022146"/>
       </p:ext>
     </p:extLst>
@@ -4212,7 +4432,7 @@
 </p:sld>
 </file>
 
-<file path=ppt/slides/slide17.xml><?xml version="1.0" encoding="utf-8"?>
+<file path=ppt/slides/slide19.xml><?xml version="1.0" encoding="utf-8"?>
 <p:sld xmlns:a="http://schemas.openxmlformats.org/drawingml/2006/main" xmlns:r="http://schemas.openxmlformats.org/officeDocument/2006/relationships" xmlns:p="http://schemas.openxmlformats.org/presentationml/2006/main">
   <p:cSld>
     <p:bg>
@@ -4412,7 +4632,7 @@
         <p:spPr/>
         <p:txBody>
           <a:bodyPr>
-            <a:normAutofit fontScale="92500" lnSpcReduction="10000"/>
+            <a:normAutofit fontScale="92500" lnSpcReduction="20000"/>
           </a:bodyPr>
           <a:lstStyle/>
           <a:p>
@@ -4421,7 +4641,7 @@
                 <a:latin typeface="Euclid Circular B" panose="020B0504000000000000" pitchFamily="34" charset="0"/>
                 <a:ea typeface="Euclid Circular B" panose="020B0504000000000000" pitchFamily="34" charset="0"/>
               </a:rPr>
-              <a:t>What is ABP Studio? Why We’ve Built It?</a:t>
+              <a:t>What is ABP Studio? Why We’ve Built it?</a:t>
             </a:r>
           </a:p>
           <a:p>
@@ -4450,7 +4670,21 @@
                 <a:latin typeface="Euclid Circular B" panose="020B0504000000000000" pitchFamily="34" charset="0"/>
                 <a:ea typeface="Euclid Circular B" panose="020B0504000000000000" pitchFamily="34" charset="0"/>
               </a:rPr>
-              <a:t>Basics: Creating Solutions / Using ABP &amp; .NET CLI Commands</a:t>
+              <a:t>Basics: </a:t>
+            </a:r>
+            <a:r>
+              <a:rPr lang="tr-TR" b="1" dirty="0">
+                <a:latin typeface="Euclid Circular B" panose="020B0504000000000000" pitchFamily="34" charset="0"/>
+                <a:ea typeface="Euclid Circular B" panose="020B0504000000000000" pitchFamily="34" charset="0"/>
+              </a:rPr>
+              <a:t>Creating </a:t>
+            </a:r>
+            <a:r>
+              <a:rPr lang="tr-TR" dirty="0">
+                <a:latin typeface="Euclid Circular B" panose="020B0504000000000000" pitchFamily="34" charset="0"/>
+                <a:ea typeface="Euclid Circular B" panose="020B0504000000000000" pitchFamily="34" charset="0"/>
+              </a:rPr>
+              <a:t>solutions / Using ABP &amp; .NET CLI commands</a:t>
             </a:r>
           </a:p>
           <a:p>
@@ -4460,7 +4694,21 @@
                 <a:latin typeface="Euclid Circular B" panose="020B0504000000000000" pitchFamily="34" charset="0"/>
                 <a:ea typeface="Euclid Circular B" panose="020B0504000000000000" pitchFamily="34" charset="0"/>
               </a:rPr>
-              <a:t>Building Modular &amp; Complex Applications</a:t>
+              <a:t>Building </a:t>
+            </a:r>
+            <a:r>
+              <a:rPr lang="tr-TR" b="1" dirty="0">
+                <a:latin typeface="Euclid Circular B" panose="020B0504000000000000" pitchFamily="34" charset="0"/>
+                <a:ea typeface="Euclid Circular B" panose="020B0504000000000000" pitchFamily="34" charset="0"/>
+              </a:rPr>
+              <a:t>modular </a:t>
+            </a:r>
+            <a:r>
+              <a:rPr lang="tr-TR" dirty="0">
+                <a:latin typeface="Euclid Circular B" panose="020B0504000000000000" pitchFamily="34" charset="0"/>
+                <a:ea typeface="Euclid Circular B" panose="020B0504000000000000" pitchFamily="34" charset="0"/>
+              </a:rPr>
+              <a:t>&amp; complex applications</a:t>
             </a:r>
           </a:p>
           <a:p>
@@ -4470,7 +4718,14 @@
                 <a:latin typeface="Euclid Circular B" panose="020B0504000000000000" pitchFamily="34" charset="0"/>
                 <a:ea typeface="Euclid Circular B" panose="020B0504000000000000" pitchFamily="34" charset="0"/>
               </a:rPr>
-              <a:t>Developing Distributed Systems / Run, Monitor &amp; Work with Kubernetes</a:t>
+              <a:t>Developing, running and monitoring </a:t>
+            </a:r>
+            <a:r>
+              <a:rPr lang="tr-TR" b="1" dirty="0">
+                <a:latin typeface="Euclid Circular B" panose="020B0504000000000000" pitchFamily="34" charset="0"/>
+                <a:ea typeface="Euclid Circular B" panose="020B0504000000000000" pitchFamily="34" charset="0"/>
+              </a:rPr>
+              <a:t>distributed dystems</a:t>
             </a:r>
           </a:p>
           <a:p>
@@ -4480,23 +4735,31 @@
                 <a:latin typeface="Euclid Circular B" panose="020B0504000000000000" pitchFamily="34" charset="0"/>
                 <a:ea typeface="Euclid Circular B" panose="020B0504000000000000" pitchFamily="34" charset="0"/>
               </a:rPr>
-              <a:t>Working with ABP Suite</a:t>
-            </a:r>
-          </a:p>
-          <a:p>
-            <a:r>
-              <a:rPr lang="tr-TR">
-                <a:latin typeface="Euclid Circular B" panose="020B0504000000000000" pitchFamily="34" charset="0"/>
-                <a:ea typeface="Euclid Circular B" panose="020B0504000000000000" pitchFamily="34" charset="0"/>
-              </a:rPr>
-              <a:t>.</a:t>
-            </a:r>
+              <a:t>Working with </a:t>
+            </a:r>
+            <a:r>
+              <a:rPr lang="tr-TR" b="1" dirty="0">
+                <a:latin typeface="Euclid Circular B" panose="020B0504000000000000" pitchFamily="34" charset="0"/>
+                <a:ea typeface="Euclid Circular B" panose="020B0504000000000000" pitchFamily="34" charset="0"/>
+              </a:rPr>
+              <a:t>Kubernetes</a:t>
+            </a:r>
+          </a:p>
+          <a:p>
+            <a:pPr lvl="1"/>
             <a:r>
               <a:rPr lang="tr-TR" dirty="0">
                 <a:latin typeface="Euclid Circular B" panose="020B0504000000000000" pitchFamily="34" charset="0"/>
                 <a:ea typeface="Euclid Circular B" panose="020B0504000000000000" pitchFamily="34" charset="0"/>
               </a:rPr>
-              <a:t>NET Aspire?</a:t>
+              <a:t>Working with </a:t>
+            </a:r>
+            <a:r>
+              <a:rPr lang="tr-TR" b="1" dirty="0">
+                <a:latin typeface="Euclid Circular B" panose="020B0504000000000000" pitchFamily="34" charset="0"/>
+                <a:ea typeface="Euclid Circular B" panose="020B0504000000000000" pitchFamily="34" charset="0"/>
+              </a:rPr>
+              <a:t>ABP Suite</a:t>
             </a:r>
           </a:p>
           <a:p>
@@ -4505,6 +4768,15 @@
                 <a:latin typeface="Euclid Circular B" panose="020B0504000000000000" pitchFamily="34" charset="0"/>
                 <a:ea typeface="Euclid Circular B" panose="020B0504000000000000" pitchFamily="34" charset="0"/>
               </a:rPr>
+              <a:t>.NET Aspire?</a:t>
+            </a:r>
+          </a:p>
+          <a:p>
+            <a:r>
+              <a:rPr lang="tr-TR" dirty="0">
+                <a:latin typeface="Euclid Circular B" panose="020B0504000000000000" pitchFamily="34" charset="0"/>
+                <a:ea typeface="Euclid Circular B" panose="020B0504000000000000" pitchFamily="34" charset="0"/>
+              </a:rPr>
               <a:t>Road Map</a:t>
             </a:r>
           </a:p>
@@ -4523,7 +4795,7 @@
                 <a:latin typeface="Euclid Circular B" panose="020B0504000000000000" pitchFamily="34" charset="0"/>
                 <a:ea typeface="Euclid Circular B" panose="020B0504000000000000" pitchFamily="34" charset="0"/>
               </a:rPr>
-              <a:t>Next Events</a:t>
+              <a:t>Next ABP Studio Events</a:t>
             </a:r>
             <a:endParaRPr lang="en-US" dirty="0">
               <a:latin typeface="Euclid Circular B" panose="020B0504000000000000" pitchFamily="34" charset="0"/>
@@ -4598,15 +4870,22 @@
           <a:lstStyle/>
           <a:p>
             <a:r>
-              <a:rPr lang="en-US" b="1" dirty="0">
+              <a:rPr lang="tr-TR" b="1" dirty="0">
                 <a:solidFill>
                   <a:srgbClr val="292D33"/>
                 </a:solidFill>
                 <a:latin typeface="Euclid Circular B" panose="020B0504000000000000" pitchFamily="34" charset="0"/>
                 <a:ea typeface="Euclid Circular B" panose="020B0504000000000000" pitchFamily="34" charset="0"/>
               </a:rPr>
-              <a:t>Topic title</a:t>
-            </a:r>
+              <a:t>ABP Studio: What it is?</a:t>
+            </a:r>
+            <a:endParaRPr lang="en-US" b="1" dirty="0">
+              <a:solidFill>
+                <a:srgbClr val="292D33"/>
+              </a:solidFill>
+              <a:latin typeface="Euclid Circular B" panose="020B0504000000000000" pitchFamily="34" charset="0"/>
+              <a:ea typeface="Euclid Circular B" panose="020B0504000000000000" pitchFamily="34" charset="0"/>
+            </a:endParaRPr>
           </a:p>
         </p:txBody>
       </p:sp>
@@ -4626,21 +4905,144 @@
             <p:ph idx="1"/>
           </p:nvPr>
         </p:nvSpPr>
-        <p:spPr/>
-        <p:txBody>
-          <a:bodyPr/>
-          <a:lstStyle/>
-          <a:p>
-            <a:r>
-              <a:rPr lang="en-US" dirty="0">
-                <a:latin typeface="Euclid Circular B" panose="020B0504000000000000" pitchFamily="34" charset="0"/>
-                <a:ea typeface="Euclid Circular B" panose="020B0504000000000000" pitchFamily="34" charset="0"/>
-              </a:rPr>
-              <a:t>Content</a:t>
-            </a:r>
-          </a:p>
-        </p:txBody>
-      </p:sp>
+        <p:spPr>
+          <a:xfrm>
+            <a:off x="838201" y="2321781"/>
+            <a:ext cx="6540610" cy="3855182"/>
+          </a:xfrm>
+        </p:spPr>
+        <p:txBody>
+          <a:bodyPr/>
+          <a:lstStyle/>
+          <a:p>
+            <a:r>
+              <a:rPr lang="tr-TR" i="1" dirty="0">
+                <a:latin typeface="Euclid Circular B" panose="020B0504000000000000" pitchFamily="34" charset="0"/>
+                <a:ea typeface="Euclid Circular B" panose="020B0504000000000000" pitchFamily="34" charset="0"/>
+              </a:rPr>
+              <a:t>A</a:t>
+            </a:r>
+            <a:r>
+              <a:rPr lang="en-US" i="1" dirty="0">
+                <a:latin typeface="Euclid Circular B" panose="020B0504000000000000" pitchFamily="34" charset="0"/>
+                <a:ea typeface="Euclid Circular B" panose="020B0504000000000000" pitchFamily="34" charset="0"/>
+              </a:rPr>
+              <a:t> </a:t>
+            </a:r>
+            <a:r>
+              <a:rPr lang="en-US" b="1" i="1" dirty="0">
+                <a:latin typeface="Euclid Circular B" panose="020B0504000000000000" pitchFamily="34" charset="0"/>
+                <a:ea typeface="Euclid Circular B" panose="020B0504000000000000" pitchFamily="34" charset="0"/>
+              </a:rPr>
+              <a:t>cross-platform desktop application </a:t>
+            </a:r>
+            <a:r>
+              <a:rPr lang="en-US" i="1" dirty="0">
+                <a:latin typeface="Euclid Circular B" panose="020B0504000000000000" pitchFamily="34" charset="0"/>
+                <a:ea typeface="Euclid Circular B" panose="020B0504000000000000" pitchFamily="34" charset="0"/>
+              </a:rPr>
+              <a:t>for ABP developers</a:t>
+            </a:r>
+            <a:r>
+              <a:rPr lang="tr-TR" i="1" dirty="0">
+                <a:latin typeface="Euclid Circular B" panose="020B0504000000000000" pitchFamily="34" charset="0"/>
+                <a:ea typeface="Euclid Circular B" panose="020B0504000000000000" pitchFamily="34" charset="0"/>
+              </a:rPr>
+              <a:t>!</a:t>
+            </a:r>
+          </a:p>
+          <a:p>
+            <a:r>
+              <a:rPr lang="tr-TR" i="1" dirty="0">
+                <a:latin typeface="Euclid Circular B" panose="020B0504000000000000" pitchFamily="34" charset="0"/>
+                <a:ea typeface="Euclid Circular B" panose="020B0504000000000000" pitchFamily="34" charset="0"/>
+              </a:rPr>
+              <a:t>A tool you use daily to simplify or automate your </a:t>
+            </a:r>
+            <a:r>
+              <a:rPr lang="tr-TR" b="1" i="1" dirty="0">
+                <a:latin typeface="Euclid Circular B" panose="020B0504000000000000" pitchFamily="34" charset="0"/>
+                <a:ea typeface="Euclid Circular B" panose="020B0504000000000000" pitchFamily="34" charset="0"/>
+              </a:rPr>
+              <a:t>non-coding activities</a:t>
+            </a:r>
+          </a:p>
+          <a:p>
+            <a:r>
+              <a:rPr lang="tr-TR" i="1" dirty="0">
+                <a:latin typeface="Euclid Circular B" panose="020B0504000000000000" pitchFamily="34" charset="0"/>
+                <a:ea typeface="Euclid Circular B" panose="020B0504000000000000" pitchFamily="34" charset="0"/>
+              </a:rPr>
+              <a:t>It is </a:t>
+            </a:r>
+            <a:r>
+              <a:rPr lang="tr-TR" b="1" i="1" dirty="0">
+                <a:latin typeface="Euclid Circular B" panose="020B0504000000000000" pitchFamily="34" charset="0"/>
+                <a:ea typeface="Euclid Circular B" panose="020B0504000000000000" pitchFamily="34" charset="0"/>
+              </a:rPr>
+              <a:t>not </a:t>
+            </a:r>
+            <a:r>
+              <a:rPr lang="tr-TR" i="1" dirty="0">
+                <a:latin typeface="Euclid Circular B" panose="020B0504000000000000" pitchFamily="34" charset="0"/>
+                <a:ea typeface="Euclid Circular B" panose="020B0504000000000000" pitchFamily="34" charset="0"/>
+              </a:rPr>
+              <a:t>a coding IDE (e.g. Visual Studio)</a:t>
+            </a:r>
+            <a:endParaRPr lang="en-US" i="1" dirty="0">
+              <a:latin typeface="Euclid Circular B" panose="020B0504000000000000" pitchFamily="34" charset="0"/>
+              <a:ea typeface="Euclid Circular B" panose="020B0504000000000000" pitchFamily="34" charset="0"/>
+            </a:endParaRPr>
+          </a:p>
+        </p:txBody>
+      </p:sp>
+      <p:pic>
+        <p:nvPicPr>
+          <p:cNvPr id="1026" name="Picture 2">
+            <a:extLst>
+              <a:ext uri="{FF2B5EF4-FFF2-40B4-BE49-F238E27FC236}">
+                <a16:creationId xmlns:a16="http://schemas.microsoft.com/office/drawing/2014/main" id="{84A98693-51AA-5614-0F0D-B39B67A7E88F}"/>
+              </a:ext>
+            </a:extLst>
+          </p:cNvPr>
+          <p:cNvPicPr>
+            <a:picLocks noChangeAspect="1" noChangeArrowheads="1"/>
+          </p:cNvPicPr>
+          <p:nvPr/>
+        </p:nvPicPr>
+        <p:blipFill>
+          <a:blip r:embed="rId3">
+            <a:extLst>
+              <a:ext uri="{28A0092B-C50C-407E-A947-70E740481C1C}">
+                <a14:useLocalDpi xmlns:a14="http://schemas.microsoft.com/office/drawing/2010/main" val="0"/>
+              </a:ext>
+            </a:extLst>
+          </a:blip>
+          <a:srcRect/>
+          <a:stretch>
+            <a:fillRect/>
+          </a:stretch>
+        </p:blipFill>
+        <p:spPr bwMode="auto">
+          <a:xfrm>
+            <a:off x="7762875" y="1638300"/>
+            <a:ext cx="4429125" cy="3581400"/>
+          </a:xfrm>
+          <a:prstGeom prst="rect">
+            <a:avLst/>
+          </a:prstGeom>
+          <a:noFill/>
+          <a:extLst>
+            <a:ext uri="{909E8E84-426E-40DD-AFC4-6F175D3DCCD1}">
+              <a14:hiddenFill xmlns:a14="http://schemas.microsoft.com/office/drawing/2010/main">
+                <a:solidFill>
+                  <a:srgbClr val="FFFFFF"/>
+                </a:solidFill>
+              </a14:hiddenFill>
+            </a:ext>
+          </a:extLst>
+        </p:spPr>
+      </p:pic>
     </p:spTree>
     <p:extLst>
       <p:ext uri="{BB962C8B-B14F-4D97-AF65-F5344CB8AC3E}">
@@ -4707,15 +5109,22 @@
           <a:lstStyle/>
           <a:p>
             <a:r>
-              <a:rPr lang="en-US" b="1" dirty="0">
+              <a:rPr lang="tr-TR" b="1" dirty="0">
                 <a:solidFill>
                   <a:srgbClr val="292D33"/>
                 </a:solidFill>
                 <a:latin typeface="Euclid Circular B" panose="020B0504000000000000" pitchFamily="34" charset="0"/>
                 <a:ea typeface="Euclid Circular B" panose="020B0504000000000000" pitchFamily="34" charset="0"/>
               </a:rPr>
-              <a:t>Topic title</a:t>
-            </a:r>
+              <a:t>ABP Studio: Why?</a:t>
+            </a:r>
+            <a:endParaRPr lang="en-US" b="1" dirty="0">
+              <a:solidFill>
+                <a:srgbClr val="292D33"/>
+              </a:solidFill>
+              <a:latin typeface="Euclid Circular B" panose="020B0504000000000000" pitchFamily="34" charset="0"/>
+              <a:ea typeface="Euclid Circular B" panose="020B0504000000000000" pitchFamily="34" charset="0"/>
+            </a:endParaRPr>
           </a:p>
         </p:txBody>
       </p:sp>
@@ -4735,25 +5144,129 @@
             <p:ph idx="1"/>
           </p:nvPr>
         </p:nvSpPr>
-        <p:spPr/>
-        <p:txBody>
-          <a:bodyPr/>
-          <a:lstStyle/>
-          <a:p>
-            <a:r>
-              <a:rPr lang="en-US" dirty="0">
-                <a:latin typeface="Euclid Circular B" panose="020B0504000000000000" pitchFamily="34" charset="0"/>
-                <a:ea typeface="Euclid Circular B" panose="020B0504000000000000" pitchFamily="34" charset="0"/>
-              </a:rPr>
-              <a:t>Content</a:t>
-            </a:r>
-          </a:p>
-        </p:txBody>
-      </p:sp>
+        <p:spPr>
+          <a:xfrm>
+            <a:off x="838200" y="1825625"/>
+            <a:ext cx="6659880" cy="4351338"/>
+          </a:xfrm>
+        </p:spPr>
+        <p:txBody>
+          <a:bodyPr>
+            <a:normAutofit/>
+          </a:bodyPr>
+          <a:lstStyle/>
+          <a:p>
+            <a:r>
+              <a:rPr lang="tr-TR" dirty="0">
+                <a:latin typeface="Euclid Circular B" panose="020B0504000000000000" pitchFamily="34" charset="0"/>
+                <a:ea typeface="Euclid Circular B" panose="020B0504000000000000" pitchFamily="34" charset="0"/>
+              </a:rPr>
+              <a:t>A single wiew of a system consists of multiple .NET solutions</a:t>
+            </a:r>
+          </a:p>
+          <a:p>
+            <a:pPr lvl="1"/>
+            <a:r>
+              <a:rPr lang="tr-TR" dirty="0">
+                <a:latin typeface="Euclid Circular B" panose="020B0504000000000000" pitchFamily="34" charset="0"/>
+                <a:ea typeface="Euclid Circular B" panose="020B0504000000000000" pitchFamily="34" charset="0"/>
+              </a:rPr>
+              <a:t>Architecting complex software solutions</a:t>
+            </a:r>
+          </a:p>
+          <a:p>
+            <a:pPr lvl="2"/>
+            <a:r>
+              <a:rPr lang="tr-TR" dirty="0">
+                <a:latin typeface="Euclid Circular B" panose="020B0504000000000000" pitchFamily="34" charset="0"/>
+                <a:ea typeface="Euclid Circular B" panose="020B0504000000000000" pitchFamily="34" charset="0"/>
+              </a:rPr>
+              <a:t>Modular monoliths</a:t>
+            </a:r>
+          </a:p>
+          <a:p>
+            <a:pPr lvl="2"/>
+            <a:r>
+              <a:rPr lang="tr-TR" dirty="0">
+                <a:latin typeface="Euclid Circular B" panose="020B0504000000000000" pitchFamily="34" charset="0"/>
+                <a:ea typeface="Euclid Circular B" panose="020B0504000000000000" pitchFamily="34" charset="0"/>
+              </a:rPr>
+              <a:t>Microservice / distributed systems</a:t>
+            </a:r>
+          </a:p>
+          <a:p>
+            <a:pPr lvl="1"/>
+            <a:r>
+              <a:rPr lang="tr-TR" dirty="0">
+                <a:latin typeface="Euclid Circular B" panose="020B0504000000000000" pitchFamily="34" charset="0"/>
+                <a:ea typeface="Euclid Circular B" panose="020B0504000000000000" pitchFamily="34" charset="0"/>
+              </a:rPr>
+              <a:t>Building &amp; managing multi-package or layered modules</a:t>
+            </a:r>
+          </a:p>
+          <a:p>
+            <a:pPr lvl="1"/>
+            <a:r>
+              <a:rPr lang="tr-TR" dirty="0">
+                <a:latin typeface="Euclid Circular B" panose="020B0504000000000000" pitchFamily="34" charset="0"/>
+                <a:ea typeface="Euclid Circular B" panose="020B0504000000000000" pitchFamily="34" charset="0"/>
+              </a:rPr>
+              <a:t>Install, uninstall and explore external modules</a:t>
+            </a:r>
+          </a:p>
+        </p:txBody>
+      </p:sp>
+      <p:pic>
+        <p:nvPicPr>
+          <p:cNvPr id="2052" name="Picture 4" descr="Architect Your Solutions">
+            <a:extLst>
+              <a:ext uri="{FF2B5EF4-FFF2-40B4-BE49-F238E27FC236}">
+                <a16:creationId xmlns:a16="http://schemas.microsoft.com/office/drawing/2014/main" id="{FDCB98E2-3C88-42D7-A6AC-25FA3E5734DC}"/>
+              </a:ext>
+            </a:extLst>
+          </p:cNvPr>
+          <p:cNvPicPr>
+            <a:picLocks noChangeAspect="1" noChangeArrowheads="1"/>
+          </p:cNvPicPr>
+          <p:nvPr/>
+        </p:nvPicPr>
+        <p:blipFill>
+          <a:blip r:embed="rId3">
+            <a:extLst>
+              <a:ext uri="{28A0092B-C50C-407E-A947-70E740481C1C}">
+                <a14:useLocalDpi xmlns:a14="http://schemas.microsoft.com/office/drawing/2010/main" val="0"/>
+              </a:ext>
+            </a:extLst>
+          </a:blip>
+          <a:srcRect/>
+          <a:stretch>
+            <a:fillRect/>
+          </a:stretch>
+        </p:blipFill>
+        <p:spPr bwMode="auto">
+          <a:xfrm>
+            <a:off x="8140424" y="1095292"/>
+            <a:ext cx="4051576" cy="4667416"/>
+          </a:xfrm>
+          <a:prstGeom prst="rect">
+            <a:avLst/>
+          </a:prstGeom>
+          <a:noFill/>
+          <a:extLst>
+            <a:ext uri="{909E8E84-426E-40DD-AFC4-6F175D3DCCD1}">
+              <a14:hiddenFill xmlns:a14="http://schemas.microsoft.com/office/drawing/2010/main">
+                <a:solidFill>
+                  <a:srgbClr val="FFFFFF"/>
+                </a:solidFill>
+              </a14:hiddenFill>
+            </a:ext>
+          </a:extLst>
+        </p:spPr>
+      </p:pic>
     </p:spTree>
     <p:extLst>
       <p:ext uri="{BB962C8B-B14F-4D97-AF65-F5344CB8AC3E}">
-        <p14:creationId xmlns:p14="http://schemas.microsoft.com/office/powerpoint/2010/main" val="3429267677"/>
+        <p14:creationId xmlns:p14="http://schemas.microsoft.com/office/powerpoint/2010/main" val="52993536"/>
       </p:ext>
     </p:extLst>
   </p:cSld>
@@ -4816,15 +5329,22 @@
           <a:lstStyle/>
           <a:p>
             <a:r>
-              <a:rPr lang="en-US" b="1" dirty="0">
+              <a:rPr lang="tr-TR" b="1" dirty="0">
                 <a:solidFill>
                   <a:srgbClr val="292D33"/>
                 </a:solidFill>
                 <a:latin typeface="Euclid Circular B" panose="020B0504000000000000" pitchFamily="34" charset="0"/>
                 <a:ea typeface="Euclid Circular B" panose="020B0504000000000000" pitchFamily="34" charset="0"/>
               </a:rPr>
-              <a:t>Topic title</a:t>
-            </a:r>
+              <a:t>ABP Studio: Why?</a:t>
+            </a:r>
+            <a:endParaRPr lang="en-US" b="1" dirty="0">
+              <a:solidFill>
+                <a:srgbClr val="292D33"/>
+              </a:solidFill>
+              <a:latin typeface="Euclid Circular B" panose="020B0504000000000000" pitchFamily="34" charset="0"/>
+              <a:ea typeface="Euclid Circular B" panose="020B0504000000000000" pitchFamily="34" charset="0"/>
+            </a:endParaRPr>
           </a:p>
         </p:txBody>
       </p:sp>
@@ -4844,25 +5364,99 @@
             <p:ph idx="1"/>
           </p:nvPr>
         </p:nvSpPr>
-        <p:spPr/>
-        <p:txBody>
-          <a:bodyPr/>
-          <a:lstStyle/>
-          <a:p>
-            <a:r>
-              <a:rPr lang="en-US" dirty="0">
-                <a:latin typeface="Euclid Circular B" panose="020B0504000000000000" pitchFamily="34" charset="0"/>
-                <a:ea typeface="Euclid Circular B" panose="020B0504000000000000" pitchFamily="34" charset="0"/>
-              </a:rPr>
-              <a:t>Content</a:t>
-            </a:r>
-          </a:p>
-        </p:txBody>
-      </p:sp>
+        <p:spPr>
+          <a:xfrm>
+            <a:off x="838200" y="1825625"/>
+            <a:ext cx="4361953" cy="4351338"/>
+          </a:xfrm>
+        </p:spPr>
+        <p:txBody>
+          <a:bodyPr>
+            <a:normAutofit/>
+          </a:bodyPr>
+          <a:lstStyle/>
+          <a:p>
+            <a:r>
+              <a:rPr lang="tr-TR" dirty="0">
+                <a:latin typeface="Euclid Circular B" panose="020B0504000000000000" pitchFamily="34" charset="0"/>
+                <a:ea typeface="Euclid Circular B" panose="020B0504000000000000" pitchFamily="34" charset="0"/>
+              </a:rPr>
+              <a:t>A single UI to control multi-application solutions</a:t>
+            </a:r>
+          </a:p>
+          <a:p>
+            <a:pPr lvl="1"/>
+            <a:r>
+              <a:rPr lang="tr-TR" dirty="0">
+                <a:latin typeface="Euclid Circular B" panose="020B0504000000000000" pitchFamily="34" charset="0"/>
+                <a:ea typeface="Euclid Circular B" panose="020B0504000000000000" pitchFamily="34" charset="0"/>
+              </a:rPr>
+              <a:t>Running multiple applications/services with a single click</a:t>
+            </a:r>
+          </a:p>
+          <a:p>
+            <a:pPr lvl="1"/>
+            <a:r>
+              <a:rPr lang="tr-TR" dirty="0">
+                <a:latin typeface="Euclid Circular B" panose="020B0504000000000000" pitchFamily="34" charset="0"/>
+                <a:ea typeface="Euclid Circular B" panose="020B0504000000000000" pitchFamily="34" charset="0"/>
+              </a:rPr>
+              <a:t>Browse, monitor, trace and debug problems across applications/services</a:t>
+            </a:r>
+          </a:p>
+        </p:txBody>
+      </p:sp>
+      <p:pic>
+        <p:nvPicPr>
+          <p:cNvPr id="3074" name="Picture 2" descr="Run Multi-Application or Microservice Solutions in a Breeze">
+            <a:extLst>
+              <a:ext uri="{FF2B5EF4-FFF2-40B4-BE49-F238E27FC236}">
+                <a16:creationId xmlns:a16="http://schemas.microsoft.com/office/drawing/2014/main" id="{00B2B66F-D8AB-063A-4026-055239842ABC}"/>
+              </a:ext>
+            </a:extLst>
+          </p:cNvPr>
+          <p:cNvPicPr>
+            <a:picLocks noChangeAspect="1" noChangeArrowheads="1"/>
+          </p:cNvPicPr>
+          <p:nvPr/>
+        </p:nvPicPr>
+        <p:blipFill>
+          <a:blip r:embed="rId3">
+            <a:extLst>
+              <a:ext uri="{28A0092B-C50C-407E-A947-70E740481C1C}">
+                <a14:useLocalDpi xmlns:a14="http://schemas.microsoft.com/office/drawing/2010/main" val="0"/>
+              </a:ext>
+            </a:extLst>
+          </a:blip>
+          <a:srcRect/>
+          <a:stretch>
+            <a:fillRect/>
+          </a:stretch>
+        </p:blipFill>
+        <p:spPr bwMode="auto">
+          <a:xfrm>
+            <a:off x="5929022" y="365125"/>
+            <a:ext cx="11692379" cy="5696990"/>
+          </a:xfrm>
+          <a:prstGeom prst="rect">
+            <a:avLst/>
+          </a:prstGeom>
+          <a:noFill/>
+          <a:extLst>
+            <a:ext uri="{909E8E84-426E-40DD-AFC4-6F175D3DCCD1}">
+              <a14:hiddenFill xmlns:a14="http://schemas.microsoft.com/office/drawing/2010/main">
+                <a:solidFill>
+                  <a:srgbClr val="FFFFFF"/>
+                </a:solidFill>
+              </a14:hiddenFill>
+            </a:ext>
+          </a:extLst>
+        </p:spPr>
+      </p:pic>
     </p:spTree>
     <p:extLst>
       <p:ext uri="{BB962C8B-B14F-4D97-AF65-F5344CB8AC3E}">
-        <p14:creationId xmlns:p14="http://schemas.microsoft.com/office/powerpoint/2010/main" val="4276238134"/>
+        <p14:creationId xmlns:p14="http://schemas.microsoft.com/office/powerpoint/2010/main" val="3429267677"/>
       </p:ext>
     </p:extLst>
   </p:cSld>
@@ -4925,15 +5519,22 @@
           <a:lstStyle/>
           <a:p>
             <a:r>
-              <a:rPr lang="en-US" b="1" dirty="0">
+              <a:rPr lang="tr-TR" b="1" dirty="0">
                 <a:solidFill>
                   <a:srgbClr val="292D33"/>
                 </a:solidFill>
                 <a:latin typeface="Euclid Circular B" panose="020B0504000000000000" pitchFamily="34" charset="0"/>
                 <a:ea typeface="Euclid Circular B" panose="020B0504000000000000" pitchFamily="34" charset="0"/>
               </a:rPr>
-              <a:t>Topic title</a:t>
-            </a:r>
+              <a:t>ABP Studio: Why?</a:t>
+            </a:r>
+            <a:endParaRPr lang="en-US" b="1" dirty="0">
+              <a:solidFill>
+                <a:srgbClr val="292D33"/>
+              </a:solidFill>
+              <a:latin typeface="Euclid Circular B" panose="020B0504000000000000" pitchFamily="34" charset="0"/>
+              <a:ea typeface="Euclid Circular B" panose="020B0504000000000000" pitchFamily="34" charset="0"/>
+            </a:endParaRPr>
           </a:p>
         </p:txBody>
       </p:sp>
@@ -4953,25 +5554,113 @@
             <p:ph idx="1"/>
           </p:nvPr>
         </p:nvSpPr>
-        <p:spPr/>
-        <p:txBody>
-          <a:bodyPr/>
-          <a:lstStyle/>
-          <a:p>
-            <a:r>
-              <a:rPr lang="en-US" dirty="0">
-                <a:latin typeface="Euclid Circular B" panose="020B0504000000000000" pitchFamily="34" charset="0"/>
-                <a:ea typeface="Euclid Circular B" panose="020B0504000000000000" pitchFamily="34" charset="0"/>
-              </a:rPr>
-              <a:t>Content</a:t>
-            </a:r>
-          </a:p>
-        </p:txBody>
-      </p:sp>
+        <p:spPr>
+          <a:xfrm>
+            <a:off x="838199" y="1825625"/>
+            <a:ext cx="6024513" cy="4351338"/>
+          </a:xfrm>
+        </p:spPr>
+        <p:txBody>
+          <a:bodyPr>
+            <a:normAutofit/>
+          </a:bodyPr>
+          <a:lstStyle/>
+          <a:p>
+            <a:r>
+              <a:rPr lang="tr-TR" dirty="0">
+                <a:latin typeface="Euclid Circular B" panose="020B0504000000000000" pitchFamily="34" charset="0"/>
+                <a:ea typeface="Euclid Circular B" panose="020B0504000000000000" pitchFamily="34" charset="0"/>
+              </a:rPr>
+              <a:t>A comfortable development environment for Kubernetes</a:t>
+            </a:r>
+          </a:p>
+          <a:p>
+            <a:pPr lvl="1"/>
+            <a:r>
+              <a:rPr lang="tr-TR" dirty="0">
+                <a:latin typeface="Euclid Circular B" panose="020B0504000000000000" pitchFamily="34" charset="0"/>
+                <a:ea typeface="Euclid Circular B" panose="020B0504000000000000" pitchFamily="34" charset="0"/>
+              </a:rPr>
+              <a:t>Seemlessly integrate your local environment to a Kubernetes cluster</a:t>
+            </a:r>
+          </a:p>
+          <a:p>
+            <a:pPr lvl="1"/>
+            <a:r>
+              <a:rPr lang="tr-TR" dirty="0">
+                <a:latin typeface="Euclid Circular B" panose="020B0504000000000000" pitchFamily="34" charset="0"/>
+                <a:ea typeface="Euclid Circular B" panose="020B0504000000000000" pitchFamily="34" charset="0"/>
+              </a:rPr>
+              <a:t>Access internal services</a:t>
+            </a:r>
+          </a:p>
+          <a:p>
+            <a:pPr lvl="1"/>
+            <a:r>
+              <a:rPr lang="tr-TR" dirty="0">
+                <a:latin typeface="Euclid Circular B" panose="020B0504000000000000" pitchFamily="34" charset="0"/>
+                <a:ea typeface="Euclid Circular B" panose="020B0504000000000000" pitchFamily="34" charset="0"/>
+              </a:rPr>
+              <a:t>Intercept traffic to run, debug and develop a service in your local environment</a:t>
+            </a:r>
+            <a:endParaRPr lang="en-US" dirty="0">
+              <a:latin typeface="Euclid Circular B" panose="020B0504000000000000" pitchFamily="34" charset="0"/>
+              <a:ea typeface="Euclid Circular B" panose="020B0504000000000000" pitchFamily="34" charset="0"/>
+            </a:endParaRPr>
+          </a:p>
+        </p:txBody>
+      </p:sp>
+      <p:pic>
+        <p:nvPicPr>
+          <p:cNvPr id="4098" name="Picture 2" descr="Integrate with your Kubernetes Cluster">
+            <a:extLst>
+              <a:ext uri="{FF2B5EF4-FFF2-40B4-BE49-F238E27FC236}">
+                <a16:creationId xmlns:a16="http://schemas.microsoft.com/office/drawing/2014/main" id="{51893D6F-78D0-6295-A235-FAA41A6F8378}"/>
+              </a:ext>
+            </a:extLst>
+          </p:cNvPr>
+          <p:cNvPicPr>
+            <a:picLocks noChangeAspect="1" noChangeArrowheads="1"/>
+          </p:cNvPicPr>
+          <p:nvPr/>
+        </p:nvPicPr>
+        <p:blipFill>
+          <a:blip r:embed="rId3">
+            <a:extLst>
+              <a:ext uri="{28A0092B-C50C-407E-A947-70E740481C1C}">
+                <a14:useLocalDpi xmlns:a14="http://schemas.microsoft.com/office/drawing/2010/main" val="0"/>
+              </a:ext>
+            </a:extLst>
+          </a:blip>
+          <a:srcRect/>
+          <a:stretch>
+            <a:fillRect/>
+          </a:stretch>
+        </p:blipFill>
+        <p:spPr bwMode="auto">
+          <a:xfrm>
+            <a:off x="7360920" y="678613"/>
+            <a:ext cx="4831080" cy="5373395"/>
+          </a:xfrm>
+          <a:prstGeom prst="rect">
+            <a:avLst/>
+          </a:prstGeom>
+          <a:noFill/>
+          <a:extLst>
+            <a:ext uri="{909E8E84-426E-40DD-AFC4-6F175D3DCCD1}">
+              <a14:hiddenFill xmlns:a14="http://schemas.microsoft.com/office/drawing/2010/main">
+                <a:solidFill>
+                  <a:srgbClr val="FFFFFF"/>
+                </a:solidFill>
+              </a14:hiddenFill>
+            </a:ext>
+          </a:extLst>
+        </p:spPr>
+      </p:pic>
     </p:spTree>
     <p:extLst>
       <p:ext uri="{BB962C8B-B14F-4D97-AF65-F5344CB8AC3E}">
-        <p14:creationId xmlns:p14="http://schemas.microsoft.com/office/powerpoint/2010/main" val="2259850710"/>
+        <p14:creationId xmlns:p14="http://schemas.microsoft.com/office/powerpoint/2010/main" val="3571708833"/>
       </p:ext>
     </p:extLst>
   </p:cSld>
@@ -5080,7 +5769,7 @@
     </p:spTree>
     <p:extLst>
       <p:ext uri="{BB962C8B-B14F-4D97-AF65-F5344CB8AC3E}">
-        <p14:creationId xmlns:p14="http://schemas.microsoft.com/office/powerpoint/2010/main" val="2722333912"/>
+        <p14:creationId xmlns:p14="http://schemas.microsoft.com/office/powerpoint/2010/main" val="4276238134"/>
       </p:ext>
     </p:extLst>
   </p:cSld>
@@ -5189,7 +5878,7 @@
     </p:spTree>
     <p:extLst>
       <p:ext uri="{BB962C8B-B14F-4D97-AF65-F5344CB8AC3E}">
-        <p14:creationId xmlns:p14="http://schemas.microsoft.com/office/powerpoint/2010/main" val="3274601683"/>
+        <p14:creationId xmlns:p14="http://schemas.microsoft.com/office/powerpoint/2010/main" val="2259850710"/>
       </p:ext>
     </p:extLst>
   </p:cSld>
@@ -5298,7 +5987,7 @@
     </p:spTree>
     <p:extLst>
       <p:ext uri="{BB962C8B-B14F-4D97-AF65-F5344CB8AC3E}">
-        <p14:creationId xmlns:p14="http://schemas.microsoft.com/office/powerpoint/2010/main" val="1519802074"/>
+        <p14:creationId xmlns:p14="http://schemas.microsoft.com/office/powerpoint/2010/main" val="2722333912"/>
       </p:ext>
     </p:extLst>
   </p:cSld>

</xml_diff>